<commit_message>
updated for fall 2017
</commit_message>
<xml_diff>
--- a/lectures/overview.pptx
+++ b/lectures/overview.pptx
@@ -18,8 +18,7 @@
     <p:sldId id="265" r:id="rId12"/>
     <p:sldId id="263" r:id="rId13"/>
     <p:sldId id="267" r:id="rId14"/>
-    <p:sldId id="270" r:id="rId15"/>
-    <p:sldId id="269" r:id="rId16"/>
+    <p:sldId id="269" r:id="rId15"/>
   </p:sldIdLst>
   <p:sldSz cx="9144000" cy="6858000" type="screen4x3"/>
   <p:notesSz cx="6858000" cy="9144000"/>
@@ -302,7 +301,7 @@
           <a:p>
             <a:fld id="{0DBCF7F0-66B2-E246-9655-E9BA5C294290}" type="datetimeFigureOut">
               <a:rPr lang="en-US" smtClean="0"/>
-              <a:t>3/3/17</a:t>
+              <a:t>9/5/17</a:t>
             </a:fld>
             <a:endParaRPr lang="en-US"/>
           </a:p>
@@ -472,7 +471,7 @@
           <a:p>
             <a:fld id="{0DBCF7F0-66B2-E246-9655-E9BA5C294290}" type="datetimeFigureOut">
               <a:rPr lang="en-US" smtClean="0"/>
-              <a:t>3/3/17</a:t>
+              <a:t>9/5/17</a:t>
             </a:fld>
             <a:endParaRPr lang="en-US"/>
           </a:p>
@@ -652,7 +651,7 @@
           <a:p>
             <a:fld id="{0DBCF7F0-66B2-E246-9655-E9BA5C294290}" type="datetimeFigureOut">
               <a:rPr lang="en-US" smtClean="0"/>
-              <a:t>3/3/17</a:t>
+              <a:t>9/5/17</a:t>
             </a:fld>
             <a:endParaRPr lang="en-US"/>
           </a:p>
@@ -822,7 +821,7 @@
           <a:p>
             <a:fld id="{0DBCF7F0-66B2-E246-9655-E9BA5C294290}" type="datetimeFigureOut">
               <a:rPr lang="en-US" smtClean="0"/>
-              <a:t>3/3/17</a:t>
+              <a:t>9/5/17</a:t>
             </a:fld>
             <a:endParaRPr lang="en-US"/>
           </a:p>
@@ -1068,7 +1067,7 @@
           <a:p>
             <a:fld id="{0DBCF7F0-66B2-E246-9655-E9BA5C294290}" type="datetimeFigureOut">
               <a:rPr lang="en-US" smtClean="0"/>
-              <a:t>3/3/17</a:t>
+              <a:t>9/5/17</a:t>
             </a:fld>
             <a:endParaRPr lang="en-US"/>
           </a:p>
@@ -1356,7 +1355,7 @@
           <a:p>
             <a:fld id="{0DBCF7F0-66B2-E246-9655-E9BA5C294290}" type="datetimeFigureOut">
               <a:rPr lang="en-US" smtClean="0"/>
-              <a:t>3/3/17</a:t>
+              <a:t>9/5/17</a:t>
             </a:fld>
             <a:endParaRPr lang="en-US"/>
           </a:p>
@@ -1778,7 +1777,7 @@
           <a:p>
             <a:fld id="{0DBCF7F0-66B2-E246-9655-E9BA5C294290}" type="datetimeFigureOut">
               <a:rPr lang="en-US" smtClean="0"/>
-              <a:t>3/3/17</a:t>
+              <a:t>9/5/17</a:t>
             </a:fld>
             <a:endParaRPr lang="en-US"/>
           </a:p>
@@ -1896,7 +1895,7 @@
           <a:p>
             <a:fld id="{0DBCF7F0-66B2-E246-9655-E9BA5C294290}" type="datetimeFigureOut">
               <a:rPr lang="en-US" smtClean="0"/>
-              <a:t>3/3/17</a:t>
+              <a:t>9/5/17</a:t>
             </a:fld>
             <a:endParaRPr lang="en-US"/>
           </a:p>
@@ -1991,7 +1990,7 @@
           <a:p>
             <a:fld id="{0DBCF7F0-66B2-E246-9655-E9BA5C294290}" type="datetimeFigureOut">
               <a:rPr lang="en-US" smtClean="0"/>
-              <a:t>3/3/17</a:t>
+              <a:t>9/5/17</a:t>
             </a:fld>
             <a:endParaRPr lang="en-US"/>
           </a:p>
@@ -2268,7 +2267,7 @@
           <a:p>
             <a:fld id="{0DBCF7F0-66B2-E246-9655-E9BA5C294290}" type="datetimeFigureOut">
               <a:rPr lang="en-US" smtClean="0"/>
-              <a:t>3/3/17</a:t>
+              <a:t>9/5/17</a:t>
             </a:fld>
             <a:endParaRPr lang="en-US"/>
           </a:p>
@@ -2521,7 +2520,7 @@
           <a:p>
             <a:fld id="{0DBCF7F0-66B2-E246-9655-E9BA5C294290}" type="datetimeFigureOut">
               <a:rPr lang="en-US" smtClean="0"/>
-              <a:t>3/3/17</a:t>
+              <a:t>9/5/17</a:t>
             </a:fld>
             <a:endParaRPr lang="en-US"/>
           </a:p>
@@ -2734,7 +2733,7 @@
           <a:p>
             <a:fld id="{0DBCF7F0-66B2-E246-9655-E9BA5C294290}" type="datetimeFigureOut">
               <a:rPr lang="en-US" smtClean="0"/>
-              <a:t>3/3/17</a:t>
+              <a:t>9/5/17</a:t>
             </a:fld>
             <a:endParaRPr lang="en-US"/>
           </a:p>
@@ -3218,7 +3217,7 @@
           <a:p>
             <a:r>
               <a:rPr lang="en-US" dirty="0" smtClean="0"/>
-              <a:t>Spring 2017</a:t>
+              <a:t>Fall 2017</a:t>
             </a:r>
             <a:endParaRPr lang="en-US" dirty="0"/>
           </a:p>
@@ -4723,7 +4722,7 @@
           <a:graphicData uri="http://schemas.openxmlformats.org/presentationml/2006/ole">
             <mc:AlternateContent xmlns:mc="http://schemas.openxmlformats.org/markup-compatibility/2006">
               <mc:Choice xmlns:v="urn:schemas-microsoft-com:vml" Requires="v">
-                <p:oleObj spid="_x0000_s4123" name="Equation" r:id="rId3" imgW="520700" imgH="228600" progId="Equation.3">
+                <p:oleObj spid="_x0000_s4129" name="Equation" r:id="rId3" imgW="520700" imgH="228600" progId="Equation.3">
                   <p:embed/>
                 </p:oleObj>
               </mc:Choice>
@@ -5250,244 +5249,6 @@
         </p:nvSpPr>
         <p:spPr>
           <a:xfrm>
-            <a:off x="457200" y="6358"/>
-            <a:ext cx="8229600" cy="1143000"/>
-          </a:xfrm>
-        </p:spPr>
-        <p:txBody>
-          <a:bodyPr/>
-          <a:lstStyle/>
-          <a:p>
-            <a:r>
-              <a:rPr lang="en-US" dirty="0" smtClean="0">
-                <a:solidFill>
-                  <a:srgbClr val="FF0000"/>
-                </a:solidFill>
-              </a:rPr>
-              <a:t>18.06</a:t>
-            </a:r>
-            <a:r>
-              <a:rPr lang="en-US" dirty="0" smtClean="0">
-                <a:solidFill>
-                  <a:srgbClr val="3366FF"/>
-                </a:solidFill>
-              </a:rPr>
-              <a:t> </a:t>
-            </a:r>
-            <a:r>
-              <a:rPr lang="en-US" dirty="0" smtClean="0"/>
-              <a:t>vs. </a:t>
-            </a:r>
-            <a:r>
-              <a:rPr lang="en-US" dirty="0" smtClean="0">
-                <a:solidFill>
-                  <a:srgbClr val="3366FF"/>
-                </a:solidFill>
-              </a:rPr>
-              <a:t>18.700</a:t>
-            </a:r>
-            <a:endParaRPr lang="en-US" dirty="0">
-              <a:solidFill>
-                <a:srgbClr val="3366FF"/>
-              </a:solidFill>
-            </a:endParaRPr>
-          </a:p>
-        </p:txBody>
-      </p:sp>
-      <p:sp>
-        <p:nvSpPr>
-          <p:cNvPr id="4" name="Rectangle 3"/>
-          <p:cNvSpPr/>
-          <p:nvPr/>
-        </p:nvSpPr>
-        <p:spPr>
-          <a:xfrm>
-            <a:off x="2001660" y="5901380"/>
-            <a:ext cx="4572000" cy="523220"/>
-          </a:xfrm>
-          <a:prstGeom prst="rect">
-            <a:avLst/>
-          </a:prstGeom>
-        </p:spPr>
-        <p:txBody>
-          <a:bodyPr>
-            <a:spAutoFit/>
-          </a:bodyPr>
-          <a:lstStyle/>
-          <a:p>
-            <a:r>
-              <a:rPr lang="en-US" sz="2800" dirty="0" smtClean="0"/>
-              <a:t>     </a:t>
-            </a:r>
-            <a:r>
-              <a:rPr lang="en-US" sz="2800" dirty="0"/>
-              <a:t>some </a:t>
-            </a:r>
-            <a:r>
-              <a:rPr lang="en-US" sz="2800" dirty="0">
-                <a:solidFill>
-                  <a:srgbClr val="FF0000"/>
-                </a:solidFill>
-              </a:rPr>
-              <a:t>puppy </a:t>
-            </a:r>
-            <a:r>
-              <a:rPr lang="en-US" sz="2800" dirty="0"/>
-              <a:t>vs. </a:t>
-            </a:r>
-            <a:r>
-              <a:rPr lang="en-US" sz="2800" dirty="0">
-                <a:solidFill>
-                  <a:srgbClr val="3366FF"/>
-                </a:solidFill>
-              </a:rPr>
-              <a:t>no puppies</a:t>
-            </a:r>
-          </a:p>
-        </p:txBody>
-      </p:sp>
-      <p:pic>
-        <p:nvPicPr>
-          <p:cNvPr id="5" name="Picture 4" descr="28800402880_dedda6448c_z.jpg"/>
-          <p:cNvPicPr>
-            <a:picLocks noChangeAspect="1"/>
-          </p:cNvPicPr>
-          <p:nvPr/>
-        </p:nvPicPr>
-        <p:blipFill>
-          <a:blip r:embed="rId2">
-            <a:extLst>
-              <a:ext uri="{28A0092B-C50C-407E-A947-70E740481C1C}">
-                <a14:useLocalDpi xmlns:a14="http://schemas.microsoft.com/office/drawing/2010/main" val="0"/>
-              </a:ext>
-            </a:extLst>
-          </a:blip>
-          <a:stretch>
-            <a:fillRect/>
-          </a:stretch>
-        </p:blipFill>
-        <p:spPr>
-          <a:xfrm>
-            <a:off x="1309244" y="1149358"/>
-            <a:ext cx="3335025" cy="4650144"/>
-          </a:xfrm>
-          <a:prstGeom prst="rect">
-            <a:avLst/>
-          </a:prstGeom>
-        </p:spPr>
-      </p:pic>
-      <p:sp>
-        <p:nvSpPr>
-          <p:cNvPr id="6" name="TextBox 5"/>
-          <p:cNvSpPr txBox="1"/>
-          <p:nvPr/>
-        </p:nvSpPr>
-        <p:spPr>
-          <a:xfrm>
-            <a:off x="4789528" y="1364964"/>
-            <a:ext cx="4157801" cy="3970318"/>
-          </a:xfrm>
-          <a:prstGeom prst="rect">
-            <a:avLst/>
-          </a:prstGeom>
-          <a:noFill/>
-        </p:spPr>
-        <p:txBody>
-          <a:bodyPr wrap="square" rtlCol="0">
-            <a:spAutoFit/>
-          </a:bodyPr>
-          <a:lstStyle/>
-          <a:p>
-            <a:r>
-              <a:rPr lang="en-US" sz="2800" dirty="0" smtClean="0">
-                <a:solidFill>
-                  <a:srgbClr val="FF0000"/>
-                </a:solidFill>
-              </a:rPr>
-              <a:t>“Cookie”</a:t>
-            </a:r>
-          </a:p>
-          <a:p>
-            <a:endParaRPr lang="en-US" sz="2800" dirty="0"/>
-          </a:p>
-          <a:p>
-            <a:r>
-              <a:rPr lang="en-US" sz="2800" dirty="0" smtClean="0"/>
-              <a:t>9-month old</a:t>
-            </a:r>
-          </a:p>
-          <a:p>
-            <a:r>
-              <a:rPr lang="en-US" sz="2800" dirty="0" err="1" smtClean="0"/>
-              <a:t>Labradoodle</a:t>
-            </a:r>
-            <a:r>
-              <a:rPr lang="en-US" sz="2800" dirty="0" smtClean="0"/>
-              <a:t> puppy</a:t>
-            </a:r>
-          </a:p>
-          <a:p>
-            <a:endParaRPr lang="en-US" sz="2800" dirty="0"/>
-          </a:p>
-          <a:p>
-            <a:r>
-              <a:rPr lang="en-US" sz="2800" dirty="0" smtClean="0"/>
-              <a:t>(Let me know privately if you don’t want to be in room with a dog, no questions</a:t>
-            </a:r>
-            <a:r>
-              <a:rPr lang="en-US" sz="2800" dirty="0"/>
-              <a:t> </a:t>
-            </a:r>
-            <a:r>
-              <a:rPr lang="en-US" sz="2800" dirty="0" smtClean="0"/>
-              <a:t>asked.)</a:t>
-            </a:r>
-            <a:endParaRPr lang="en-US" sz="2800" dirty="0"/>
-          </a:p>
-        </p:txBody>
-      </p:sp>
-    </p:spTree>
-    <p:extLst>
-      <p:ext uri="{BB962C8B-B14F-4D97-AF65-F5344CB8AC3E}">
-        <p14:creationId xmlns:p14="http://schemas.microsoft.com/office/powerpoint/2010/main" val="3687280445"/>
-      </p:ext>
-    </p:extLst>
-  </p:cSld>
-  <p:clrMapOvr>
-    <a:masterClrMapping/>
-  </p:clrMapOvr>
-</p:sld>
-</file>
-
-<file path=ppt/slides/slide15.xml><?xml version="1.0" encoding="utf-8"?>
-<p:sld xmlns:a="http://schemas.openxmlformats.org/drawingml/2006/main" xmlns:r="http://schemas.openxmlformats.org/officeDocument/2006/relationships" xmlns:p="http://schemas.openxmlformats.org/presentationml/2006/main">
-  <p:cSld>
-    <p:spTree>
-      <p:nvGrpSpPr>
-        <p:cNvPr id="1" name=""/>
-        <p:cNvGrpSpPr/>
-        <p:nvPr/>
-      </p:nvGrpSpPr>
-      <p:grpSpPr>
-        <a:xfrm>
-          <a:off x="0" y="0"/>
-          <a:ext cx="0" cy="0"/>
-          <a:chOff x="0" y="0"/>
-          <a:chExt cx="0" cy="0"/>
-        </a:xfrm>
-      </p:grpSpPr>
-      <p:sp>
-        <p:nvSpPr>
-          <p:cNvPr id="2" name="Title 1"/>
-          <p:cNvSpPr>
-            <a:spLocks noGrp="1"/>
-          </p:cNvSpPr>
-          <p:nvPr>
-            <p:ph type="title"/>
-          </p:nvPr>
-        </p:nvSpPr>
-        <p:spPr>
-          <a:xfrm>
             <a:off x="457200" y="0"/>
             <a:ext cx="8229600" cy="846603"/>
           </a:xfrm>
@@ -5796,7 +5557,31 @@
                   <a:srgbClr val="0000FF"/>
                 </a:solidFill>
               </a:rPr>
-              <a:t>Optional tutorial: Friday 5pm 32-123</a:t>
+              <a:t>Optional tutorial: Monday 5pm </a:t>
+            </a:r>
+            <a:r>
+              <a:rPr lang="en-US" sz="2000" smtClean="0">
+                <a:solidFill>
+                  <a:srgbClr val="0000FF"/>
+                </a:solidFill>
+              </a:rPr>
+              <a:t>32</a:t>
+            </a:r>
+            <a:r>
+              <a:rPr lang="en-US" sz="2000" smtClean="0">
+                <a:solidFill>
+                  <a:srgbClr val="0000FF"/>
+                </a:solidFill>
+              </a:rPr>
+              <a:t>-</a:t>
+            </a:r>
+            <a:r>
+              <a:rPr lang="en-US" sz="2000" smtClean="0">
+                <a:solidFill>
+                  <a:srgbClr val="0000FF"/>
+                </a:solidFill>
+              </a:rPr>
+              <a:t>xxx</a:t>
             </a:r>
             <a:endParaRPr lang="en-US" sz="2000" dirty="0">
               <a:solidFill>
@@ -6010,7 +5795,7 @@
         <p:spPr>
           <a:xfrm>
             <a:off x="312444" y="1653077"/>
-            <a:ext cx="8876449" cy="4062651"/>
+            <a:ext cx="8052079" cy="4401205"/>
           </a:xfrm>
           <a:prstGeom prst="rect">
             <a:avLst/>
@@ -6137,19 +5922,17 @@
             </a:r>
             <a:r>
               <a:rPr lang="en-US" sz="2000" dirty="0" smtClean="0"/>
-              <a:t>(3/3, 4/10, &amp; 5/5 </a:t>
-            </a:r>
-            <a:r>
-              <a:rPr lang="en-US" sz="2000" smtClean="0"/>
-              <a:t>in </a:t>
-            </a:r>
-            <a:r>
-              <a:rPr lang="en-US" sz="2000" smtClean="0"/>
-              <a:t>50-</a:t>
-            </a:r>
-            <a:r>
-              <a:rPr lang="en-US" sz="2000" dirty="0" smtClean="0"/>
-              <a:t>340), </a:t>
+              <a:t>(9/25, 10/30, &amp; 11/27 in 50-340),</a:t>
+            </a:r>
+          </a:p>
+          <a:p>
+            <a:r>
+              <a:rPr lang="en-US" sz="2000" dirty="0">
+                <a:solidFill>
+                  <a:srgbClr val="0000FF"/>
+                </a:solidFill>
+              </a:rPr>
+              <a:t> </a:t>
             </a:r>
             <a:r>
               <a:rPr lang="en-US" sz="2000" dirty="0" smtClean="0">
@@ -6157,7 +5940,7 @@
                   <a:srgbClr val="0000FF"/>
                 </a:solidFill>
               </a:rPr>
-              <a:t>final exam 40%</a:t>
+              <a:t>                &amp; final exam 40%</a:t>
             </a:r>
           </a:p>
           <a:p>
@@ -6395,7 +6178,7 @@
             </a:r>
             <a:r>
               <a:rPr lang="en-US" dirty="0" smtClean="0"/>
-              <a:t>for attending lecture.</a:t>
+              <a:t>for attending lecture. Likely topics:</a:t>
             </a:r>
           </a:p>
           <a:p>
@@ -6410,7 +6193,7 @@
                   <a:srgbClr val="0000FF"/>
                 </a:solidFill>
               </a:rPr>
-              <a:t>Exam 1: Friday 3/3. </a:t>
+              <a:t>Exam 1: Monday 9/25. </a:t>
             </a:r>
             <a:r>
               <a:rPr lang="en-US" dirty="0" smtClean="0"/>
@@ -6426,7 +6209,7 @@
             </a:r>
             <a:r>
               <a:rPr lang="en-US" dirty="0" smtClean="0"/>
-              <a:t>and other subspaces, bases and dimensions, vector spaces. (Book: 1–3.5.)</a:t>
+              <a:t>and other subspaces, bases and dimensions, vector spaces, complexity. (Book: 1–3.5, 11.1)</a:t>
             </a:r>
           </a:p>
           <a:p>
@@ -6441,7 +6224,23 @@
                   <a:srgbClr val="0000FF"/>
                 </a:solidFill>
               </a:rPr>
-              <a:t>Exam 2: Monday 4/10. </a:t>
+              <a:t>Exam 2: Monday 10/</a:t>
+            </a:r>
+            <a:r>
+              <a:rPr lang="en-US" dirty="0">
+                <a:solidFill>
+                  <a:srgbClr val="0000FF"/>
+                </a:solidFill>
+              </a:rPr>
+              <a:t>3</a:t>
+            </a:r>
+            <a:r>
+              <a:rPr lang="en-US" dirty="0" smtClean="0">
+                <a:solidFill>
+                  <a:srgbClr val="0000FF"/>
+                </a:solidFill>
+              </a:rPr>
+              <a:t>0. </a:t>
             </a:r>
             <a:r>
               <a:rPr lang="en-US" dirty="0" err="1" smtClean="0"/>
@@ -6449,7 +6248,23 @@
             </a:r>
             <a:r>
               <a:rPr lang="en-US" dirty="0" smtClean="0"/>
-              <a:t>, projections, least-squares, QR, Gram-Schmidt, orthogonal functions, complexity. (Book: 1–4, 10.5, 11.1).</a:t>
+              <a:t>, projections, least-squares, QR</a:t>
+            </a:r>
+            <a:r>
+              <a:rPr lang="en-US" smtClean="0"/>
+              <a:t>, Gram–Schmidt</a:t>
+            </a:r>
+            <a:r>
+              <a:rPr lang="en-US" dirty="0" smtClean="0"/>
+              <a:t>, orthogonal functions</a:t>
+            </a:r>
+            <a:r>
+              <a:rPr lang="en-US" dirty="0"/>
+              <a:t> </a:t>
+            </a:r>
+            <a:r>
+              <a:rPr lang="en-US" dirty="0" smtClean="0"/>
+              <a:t>(Book: 1–4, 10.5).</a:t>
             </a:r>
           </a:p>
           <a:p>
@@ -6464,7 +6279,7 @@
                   <a:srgbClr val="0000FF"/>
                 </a:solidFill>
               </a:rPr>
-              <a:t>Exam 3: Friday 5/5.</a:t>
+              <a:t>Exam 3: Monday 11/27.</a:t>
             </a:r>
             <a:r>
               <a:rPr lang="en-US" dirty="0" smtClean="0"/>
@@ -6614,7 +6429,7 @@
           <a:graphicData uri="http://schemas.openxmlformats.org/presentationml/2006/ole">
             <mc:AlternateContent xmlns:mc="http://schemas.openxmlformats.org/markup-compatibility/2006">
               <mc:Choice xmlns:v="urn:schemas-microsoft-com:vml" Requires="v">
-                <p:oleObj spid="_x0000_s1092" name="Equation" r:id="rId3" imgW="1282700" imgH="685800" progId="Equation.3">
+                <p:oleObj spid="_x0000_s1102" name="Equation" r:id="rId3" imgW="1282700" imgH="685800" progId="Equation.3">
                   <p:embed/>
                 </p:oleObj>
               </mc:Choice>
@@ -6862,7 +6677,7 @@
           <a:graphicData uri="http://schemas.openxmlformats.org/presentationml/2006/ole">
             <mc:AlternateContent xmlns:mc="http://schemas.openxmlformats.org/markup-compatibility/2006">
               <mc:Choice xmlns:v="urn:schemas-microsoft-com:vml" Requires="v">
-                <p:oleObj spid="_x0000_s1093" name="Equation" r:id="rId5" imgW="2082800" imgH="812800" progId="Equation.3">
+                <p:oleObj spid="_x0000_s1103" name="Equation" r:id="rId5" imgW="2082800" imgH="812800" progId="Equation.3">
                   <p:embed/>
                 </p:oleObj>
               </mc:Choice>
@@ -7604,7 +7419,7 @@
           <a:graphicData uri="http://schemas.openxmlformats.org/presentationml/2006/ole">
             <mc:AlternateContent xmlns:mc="http://schemas.openxmlformats.org/markup-compatibility/2006">
               <mc:Choice xmlns:v="urn:schemas-microsoft-com:vml" Requires="v">
-                <p:oleObj spid="_x0000_s3106" name="Equation" r:id="rId3" imgW="2082800" imgH="812800" progId="Equation.3">
+                <p:oleObj spid="_x0000_s3112" name="Equation" r:id="rId3" imgW="2082800" imgH="812800" progId="Equation.3">
                   <p:embed/>
                 </p:oleObj>
               </mc:Choice>

</xml_diff>